<commit_message>
mid fall 2021 updates
</commit_message>
<xml_diff>
--- a/slides/Ch13_multcomp.pptx
+++ b/slides/Ch13_multcomp.pptx
@@ -292,7 +292,7 @@
           <a:p>
             <a:fld id="{463B2355-98C8-451F-BE71-5FA915B2B77F}" type="datetimeFigureOut">
               <a:rPr lang="en-US" smtClean="0"/>
-              <a:t>3/23/2020</a:t>
+              <a:t>6/9/2021</a:t>
             </a:fld>
             <a:endParaRPr lang="en-US"/>
           </a:p>
@@ -958,7 +958,7 @@
           <a:p>
             <a:fld id="{BF51102F-D16F-450B-92EC-1636F3DEA3CF}" type="datetime1">
               <a:rPr lang="en-US" smtClean="0"/>
-              <a:t>3/23/2020</a:t>
+              <a:t>6/9/2021</a:t>
             </a:fld>
             <a:endParaRPr lang="en-US"/>
           </a:p>
@@ -1160,7 +1160,7 @@
           <a:p>
             <a:fld id="{3EF881BE-3647-4E8E-965D-9BE37AB12216}" type="datetime1">
               <a:rPr lang="en-US" smtClean="0"/>
-              <a:t>3/23/2020</a:t>
+              <a:t>6/9/2021</a:t>
             </a:fld>
             <a:endParaRPr lang="en-US"/>
           </a:p>
@@ -1372,7 +1372,7 @@
           <a:p>
             <a:fld id="{F4EBB052-23E7-4B7D-8887-7C9A087AFF7E}" type="datetime1">
               <a:rPr lang="en-US" smtClean="0"/>
-              <a:t>3/23/2020</a:t>
+              <a:t>6/9/2021</a:t>
             </a:fld>
             <a:endParaRPr lang="en-US"/>
           </a:p>
@@ -1574,7 +1574,7 @@
           <a:p>
             <a:fld id="{75B54F45-174B-43C8-9A57-238A510789D3}" type="datetime1">
               <a:rPr lang="en-US" smtClean="0"/>
-              <a:t>3/23/2020</a:t>
+              <a:t>6/9/2021</a:t>
             </a:fld>
             <a:endParaRPr lang="en-US"/>
           </a:p>
@@ -1853,7 +1853,7 @@
           <a:p>
             <a:fld id="{6EAFBBBC-1B30-4B3A-BC65-2F22068A25A0}" type="datetime1">
               <a:rPr lang="en-US" smtClean="0"/>
-              <a:t>3/23/2020</a:t>
+              <a:t>6/9/2021</a:t>
             </a:fld>
             <a:endParaRPr lang="en-US"/>
           </a:p>
@@ -2122,7 +2122,7 @@
           <a:p>
             <a:fld id="{6D56A113-6C84-4778-8F17-4570CE1EEC73}" type="datetime1">
               <a:rPr lang="en-US" smtClean="0"/>
-              <a:t>3/23/2020</a:t>
+              <a:t>6/9/2021</a:t>
             </a:fld>
             <a:endParaRPr lang="en-US"/>
           </a:p>
@@ -2538,7 +2538,7 @@
           <a:p>
             <a:fld id="{CC490D4F-B031-4E88-922B-2BF67D689489}" type="datetime1">
               <a:rPr lang="en-US" smtClean="0"/>
-              <a:t>3/23/2020</a:t>
+              <a:t>6/9/2021</a:t>
             </a:fld>
             <a:endParaRPr lang="en-US"/>
           </a:p>
@@ -2683,7 +2683,7 @@
           <a:p>
             <a:fld id="{9F36D5CD-407C-4B80-844A-D4664471AA78}" type="datetime1">
               <a:rPr lang="en-US" smtClean="0"/>
-              <a:t>3/23/2020</a:t>
+              <a:t>6/9/2021</a:t>
             </a:fld>
             <a:endParaRPr lang="en-US"/>
           </a:p>
@@ -2800,7 +2800,7 @@
           <a:p>
             <a:fld id="{BFDC0ADA-5853-4B4D-BD40-725524069051}" type="datetime1">
               <a:rPr lang="en-US" smtClean="0"/>
-              <a:t>3/23/2020</a:t>
+              <a:t>6/9/2021</a:t>
             </a:fld>
             <a:endParaRPr lang="en-US"/>
           </a:p>
@@ -3115,7 +3115,7 @@
           <a:p>
             <a:fld id="{15E750BA-3ABA-4E54-87AF-6CF52D58B6D6}" type="datetime1">
               <a:rPr lang="en-US" smtClean="0"/>
-              <a:t>3/23/2020</a:t>
+              <a:t>6/9/2021</a:t>
             </a:fld>
             <a:endParaRPr lang="en-US"/>
           </a:p>
@@ -3407,7 +3407,7 @@
           <a:p>
             <a:fld id="{E19E4165-8A58-43E7-B212-26BE50C443F8}" type="datetime1">
               <a:rPr lang="en-US" smtClean="0"/>
-              <a:t>3/23/2020</a:t>
+              <a:t>6/9/2021</a:t>
             </a:fld>
             <a:endParaRPr lang="en-US"/>
           </a:p>
@@ -3652,7 +3652,7 @@
           <a:p>
             <a:fld id="{E5047E7D-B7F7-4472-A3DB-C42A1857E6E4}" type="datetime1">
               <a:rPr lang="en-US" smtClean="0"/>
-              <a:t>3/23/2020</a:t>
+              <a:t>6/9/2021</a:t>
             </a:fld>
             <a:endParaRPr lang="en-US"/>
           </a:p>
@@ -4954,7 +4954,6 @@
           <a:ln>
             <a:noFill/>
           </a:ln>
-          <a:extLst/>
         </p:spPr>
         <p:txBody>
           <a:bodyPr vert="horz" wrap="square" lIns="91440" tIns="45720" rIns="91440" bIns="45720" numCol="1" anchor="t" anchorCtr="0" compatLnSpc="1">
@@ -5653,7 +5652,6 @@
           <a:ln>
             <a:noFill/>
           </a:ln>
-          <a:extLst/>
         </p:spPr>
         <p:txBody>
           <a:bodyPr vert="horz" wrap="square" lIns="91440" tIns="45720" rIns="91440" bIns="45720" numCol="1" anchor="t" anchorCtr="0" compatLnSpc="1">
@@ -6297,13 +6295,6 @@
   <p:clrMapOvr>
     <a:masterClrMapping/>
   </p:clrMapOvr>
-  <p:timing>
-    <p:tnLst>
-      <p:par>
-        <p:cTn id="1" dur="indefinite" restart="never" nodeType="tmRoot"/>
-      </p:par>
-    </p:tnLst>
-  </p:timing>
 </p:sld>
 </file>
 
@@ -6965,13 +6956,6 @@
   <p:clrMapOvr>
     <a:masterClrMapping/>
   </p:clrMapOvr>
-  <p:timing>
-    <p:tnLst>
-      <p:par>
-        <p:cTn id="1" dur="indefinite" restart="never" nodeType="tmRoot"/>
-      </p:par>
-    </p:tnLst>
-  </p:timing>
 </p:sld>
 </file>
 
@@ -7620,13 +7604,6 @@
   <p:clrMapOvr>
     <a:masterClrMapping/>
   </p:clrMapOvr>
-  <p:timing>
-    <p:tnLst>
-      <p:par>
-        <p:cTn id="1" dur="indefinite" restart="never" nodeType="tmRoot"/>
-      </p:par>
-    </p:tnLst>
-  </p:timing>
 </p:sld>
 </file>
 
@@ -8171,13 +8148,6 @@
   <p:clrMapOvr>
     <a:masterClrMapping/>
   </p:clrMapOvr>
-  <p:timing>
-    <p:tnLst>
-      <p:par>
-        <p:cTn id="1" dur="indefinite" restart="never" nodeType="tmRoot"/>
-      </p:par>
-    </p:tnLst>
-  </p:timing>
 </p:sld>
 </file>
 
@@ -9028,13 +8998,6 @@
   <p:clrMapOvr>
     <a:masterClrMapping/>
   </p:clrMapOvr>
-  <p:timing>
-    <p:tnLst>
-      <p:par>
-        <p:cTn id="1" dur="indefinite" restart="never" nodeType="tmRoot"/>
-      </p:par>
-    </p:tnLst>
-  </p:timing>
 </p:sld>
 </file>
 
@@ -9396,12 +9359,12 @@
           <a:graphicData uri="http://schemas.openxmlformats.org/presentationml/2006/ole">
             <mc:AlternateContent xmlns:mc="http://schemas.openxmlformats.org/markup-compatibility/2006">
               <mc:Choice xmlns:v="urn:schemas-microsoft-com:vml" Requires="v">
-                <p:oleObj spid="_x0000_s5252" name="Equation" r:id="rId3" imgW="495000" imgH="495000" progId="Equation.DSMT4">
+                <p:oleObj name="Equation" r:id="rId2" imgW="495000" imgH="495000" progId="Equation.DSMT4">
                   <p:embed/>
                 </p:oleObj>
               </mc:Choice>
               <mc:Fallback>
-                <p:oleObj name="Equation" r:id="rId3" imgW="495000" imgH="495000" progId="Equation.DSMT4">
+                <p:oleObj name="Equation" r:id="rId2" imgW="495000" imgH="495000" progId="Equation.DSMT4">
                   <p:embed/>
                   <p:pic>
                     <p:nvPicPr>
@@ -9412,7 +9375,7 @@
                       <p:nvPr/>
                     </p:nvPicPr>
                     <p:blipFill>
-                      <a:blip r:embed="rId4">
+                      <a:blip r:embed="rId3">
                         <a:extLst>
                           <a:ext uri="{28A0092B-C50C-407E-A947-70E740481C1C}">
                             <a14:useLocalDpi xmlns:a14="http://schemas.microsoft.com/office/drawing/2010/main" val="0"/>
@@ -10043,12 +10006,12 @@
           <a:graphicData uri="http://schemas.openxmlformats.org/presentationml/2006/ole">
             <mc:AlternateContent xmlns:mc="http://schemas.openxmlformats.org/markup-compatibility/2006">
               <mc:Choice xmlns:v="urn:schemas-microsoft-com:vml" Requires="v">
-                <p:oleObj spid="_x0000_s5253" name="Equation" r:id="rId5" imgW="787320" imgH="698400" progId="Equation.DSMT4">
+                <p:oleObj name="Equation" r:id="rId4" imgW="787320" imgH="698400" progId="Equation.DSMT4">
                   <p:embed/>
                 </p:oleObj>
               </mc:Choice>
               <mc:Fallback>
-                <p:oleObj name="Equation" r:id="rId5" imgW="787320" imgH="698400" progId="Equation.DSMT4">
+                <p:oleObj name="Equation" r:id="rId4" imgW="787320" imgH="698400" progId="Equation.DSMT4">
                   <p:embed/>
                   <p:pic>
                     <p:nvPicPr>
@@ -10059,7 +10022,7 @@
                       <p:nvPr/>
                     </p:nvPicPr>
                     <p:blipFill>
-                      <a:blip r:embed="rId6">
+                      <a:blip r:embed="rId5">
                         <a:extLst>
                           <a:ext uri="{28A0092B-C50C-407E-A947-70E740481C1C}">
                             <a14:useLocalDpi xmlns:a14="http://schemas.microsoft.com/office/drawing/2010/main" val="0"/>
@@ -10107,13 +10070,6 @@
   <p:clrMapOvr>
     <a:masterClrMapping/>
   </p:clrMapOvr>
-  <p:timing>
-    <p:tnLst>
-      <p:par>
-        <p:cTn id="1" dur="indefinite" restart="never" nodeType="tmRoot"/>
-      </p:par>
-    </p:tnLst>
-  </p:timing>
 </p:sld>
 </file>
 
@@ -10932,13 +10888,6 @@
   <p:clrMapOvr>
     <a:masterClrMapping/>
   </p:clrMapOvr>
-  <p:timing>
-    <p:tnLst>
-      <p:par>
-        <p:cTn id="1" dur="indefinite" restart="never" nodeType="tmRoot"/>
-      </p:par>
-    </p:tnLst>
-  </p:timing>
 </p:sld>
 </file>
 
@@ -11817,12 +11766,12 @@
           <a:graphicData uri="http://schemas.openxmlformats.org/presentationml/2006/ole">
             <mc:AlternateContent xmlns:mc="http://schemas.openxmlformats.org/markup-compatibility/2006">
               <mc:Choice xmlns:v="urn:schemas-microsoft-com:vml" Requires="v">
-                <p:oleObj spid="_x0000_s6212" name="Equation" r:id="rId3" imgW="787320" imgH="698400" progId="Equation.DSMT4">
+                <p:oleObj name="Equation" r:id="rId2" imgW="787320" imgH="698400" progId="Equation.DSMT4">
                   <p:embed/>
                 </p:oleObj>
               </mc:Choice>
               <mc:Fallback>
-                <p:oleObj name="Equation" r:id="rId3" imgW="787320" imgH="698400" progId="Equation.DSMT4">
+                <p:oleObj name="Equation" r:id="rId2" imgW="787320" imgH="698400" progId="Equation.DSMT4">
                   <p:embed/>
                   <p:pic>
                     <p:nvPicPr>
@@ -11833,7 +11782,7 @@
                       <p:nvPr/>
                     </p:nvPicPr>
                     <p:blipFill>
-                      <a:blip r:embed="rId4">
+                      <a:blip r:embed="rId3">
                         <a:extLst>
                           <a:ext uri="{28A0092B-C50C-407E-A947-70E740481C1C}">
                             <a14:useLocalDpi xmlns:a14="http://schemas.microsoft.com/office/drawing/2010/main" val="0"/>
@@ -11903,7 +11852,7 @@
           <p:nvPr/>
         </p:nvPicPr>
         <p:blipFill>
-          <a:blip r:embed="rId5"/>
+          <a:blip r:embed="rId4"/>
           <a:stretch>
             <a:fillRect/>
           </a:stretch>
@@ -11960,13 +11909,6 @@
   <p:clrMapOvr>
     <a:masterClrMapping/>
   </p:clrMapOvr>
-  <p:timing>
-    <p:tnLst>
-      <p:par>
-        <p:cTn id="1" dur="indefinite" restart="never" nodeType="tmRoot"/>
-      </p:par>
-    </p:tnLst>
-  </p:timing>
 </p:sld>
 </file>
 
@@ -12885,13 +12827,6 @@
   <p:clrMapOvr>
     <a:masterClrMapping/>
   </p:clrMapOvr>
-  <p:timing>
-    <p:tnLst>
-      <p:par>
-        <p:cTn id="1" dur="indefinite" restart="never" nodeType="tmRoot"/>
-      </p:par>
-    </p:tnLst>
-  </p:timing>
 </p:sld>
 </file>
 
@@ -13642,13 +13577,6 @@
   <p:clrMapOvr>
     <a:masterClrMapping/>
   </p:clrMapOvr>
-  <p:timing>
-    <p:tnLst>
-      <p:par>
-        <p:cTn id="1" dur="indefinite" restart="never" nodeType="tmRoot"/>
-      </p:par>
-    </p:tnLst>
-  </p:timing>
 </p:sld>
 </file>
 
@@ -13732,12 +13660,12 @@
           <a:graphicData uri="http://schemas.openxmlformats.org/presentationml/2006/ole">
             <mc:AlternateContent xmlns:mc="http://schemas.openxmlformats.org/markup-compatibility/2006">
               <mc:Choice xmlns:v="urn:schemas-microsoft-com:vml" Requires="v">
-                <p:oleObj spid="_x0000_s7235" name="Equation" r:id="rId3" imgW="787320" imgH="698400" progId="Equation.DSMT4">
+                <p:oleObj name="Equation" r:id="rId2" imgW="787320" imgH="698400" progId="Equation.DSMT4">
                   <p:embed/>
                 </p:oleObj>
               </mc:Choice>
               <mc:Fallback>
-                <p:oleObj name="Equation" r:id="rId3" imgW="787320" imgH="698400" progId="Equation.DSMT4">
+                <p:oleObj name="Equation" r:id="rId2" imgW="787320" imgH="698400" progId="Equation.DSMT4">
                   <p:embed/>
                   <p:pic>
                     <p:nvPicPr>
@@ -13748,7 +13676,7 @@
                       <p:nvPr/>
                     </p:nvPicPr>
                     <p:blipFill>
-                      <a:blip r:embed="rId4">
+                      <a:blip r:embed="rId3">
                         <a:extLst>
                           <a:ext uri="{28A0092B-C50C-407E-A947-70E740481C1C}">
                             <a14:useLocalDpi xmlns:a14="http://schemas.microsoft.com/office/drawing/2010/main" val="0"/>
@@ -14485,13 +14413,6 @@
   <p:clrMapOvr>
     <a:masterClrMapping/>
   </p:clrMapOvr>
-  <p:timing>
-    <p:tnLst>
-      <p:par>
-        <p:cTn id="1" dur="indefinite" restart="never" nodeType="tmRoot"/>
-      </p:par>
-    </p:tnLst>
-  </p:timing>
 </p:sld>
 </file>
 
@@ -15158,13 +15079,6 @@
   <p:clrMapOvr>
     <a:masterClrMapping/>
   </p:clrMapOvr>
-  <p:timing>
-    <p:tnLst>
-      <p:par>
-        <p:cTn id="1" dur="indefinite" restart="never" nodeType="tmRoot"/>
-      </p:par>
-    </p:tnLst>
-  </p:timing>
 </p:sld>
 </file>
 
@@ -15232,26 +15146,11 @@
           <a:lstStyle/>
           <a:p>
             <a:r>
-              <a:rPr lang="en-US" sz="3200" dirty="0" smtClean="0">
-                <a:latin typeface="PT Serif" panose="020A0603040505020204" pitchFamily="18" charset="77"/>
-              </a:rPr>
-              <a:t>Chap 12 - Example</a:t>
-            </a:r>
-            <a:r>
               <a:rPr lang="en-US" sz="3200" dirty="0">
                 <a:latin typeface="PT Serif" panose="020A0603040505020204" pitchFamily="18" charset="77"/>
               </a:rPr>
-              <a:t>: </a:t>
-            </a:r>
-            <a:r>
-              <a:rPr lang="en-US" sz="3200" dirty="0" smtClean="0">
-                <a:latin typeface="PT Serif" panose="020A0603040505020204" pitchFamily="18" charset="77"/>
-              </a:rPr>
-              <a:t>Exploratory Data Analysis</a:t>
-            </a:r>
-            <a:endParaRPr lang="en-US" sz="3200" dirty="0">
-              <a:latin typeface="PT Serif" panose="020A0603040505020204" pitchFamily="18" charset="77"/>
-            </a:endParaRPr>
+              <a:t>Chap 12 - Example: Exploratory Data Analysis</a:t>
+            </a:r>
           </a:p>
         </p:txBody>
       </p:sp>
@@ -15314,7 +15213,6 @@
               <a:srgbClr val="FFFFFF"/>
             </a:contourClr>
           </a:sp3d>
-          <a:extLst/>
         </p:spPr>
       </p:pic>
       <p:grpSp>
@@ -16068,7 +15966,7 @@
                 <a:t>2. </a:t>
               </a:r>
               <a:r>
-                <a:rPr lang="en-US" sz="2000" dirty="0" err="1" smtClean="0">
+                <a:rPr lang="en-US" sz="2000" dirty="0" err="1">
                   <a:solidFill>
                     <a:srgbClr val="FFFF00"/>
                   </a:solidFill>
@@ -16077,40 +15975,13 @@
                 <a:t>Calc</a:t>
               </a:r>
               <a:r>
-                <a:rPr lang="en-US" sz="2000" dirty="0" smtClean="0">
-                  <a:solidFill>
-                    <a:srgbClr val="FFFF00"/>
-                  </a:solidFill>
-                  <a:latin typeface="PT Serif" panose="020A0603040505020204" pitchFamily="18" charset="77"/>
-                </a:rPr>
-                <a:t> </a:t>
-              </a:r>
-              <a:r>
                 <a:rPr lang="en-US" sz="2000" dirty="0">
                   <a:solidFill>
                     <a:srgbClr val="FFFF00"/>
                   </a:solidFill>
                   <a:latin typeface="PT Serif" panose="020A0603040505020204" pitchFamily="18" charset="77"/>
                 </a:rPr>
-                <a:t>the </a:t>
-              </a:r>
-              <a:r>
-                <a:rPr lang="en-US" sz="2000" dirty="0" smtClean="0">
-                  <a:solidFill>
-                    <a:srgbClr val="FFFF00"/>
-                  </a:solidFill>
-                  <a:latin typeface="PT Serif" panose="020A0603040505020204" pitchFamily="18" charset="77"/>
-                </a:rPr>
-                <a:t>Group </a:t>
-              </a:r>
-              <a:r>
-                <a:rPr lang="en-US" sz="2000" dirty="0">
-                  <a:solidFill>
-                    <a:srgbClr val="FFFF00"/>
-                  </a:solidFill>
-                  <a:latin typeface="PT Serif" panose="020A0603040505020204" pitchFamily="18" charset="77"/>
-                </a:rPr>
-                <a:t>Means</a:t>
+                <a:t> the Group Means</a:t>
               </a:r>
             </a:p>
           </p:txBody>
@@ -16825,23 +16696,8 @@
                   </a:solidFill>
                   <a:latin typeface="PT Serif" panose="020A0603040505020204" pitchFamily="18" charset="77"/>
                 </a:rPr>
-                <a:t>1</a:t>
+                <a:t>1. Test Assumption of HOV</a:t>
               </a:r>
-              <a:r>
-                <a:rPr lang="en-US" sz="2000" dirty="0" smtClean="0">
-                  <a:solidFill>
-                    <a:srgbClr val="FFFF00"/>
-                  </a:solidFill>
-                  <a:latin typeface="PT Serif" panose="020A0603040505020204" pitchFamily="18" charset="77"/>
-                </a:rPr>
-                <a:t>. Test Assumption of HOV</a:t>
-              </a:r>
-              <a:endParaRPr lang="en-US" sz="2000" dirty="0">
-                <a:solidFill>
-                  <a:srgbClr val="FFFF00"/>
-                </a:solidFill>
-                <a:latin typeface="PT Serif" panose="020A0603040505020204" pitchFamily="18" charset="77"/>
-              </a:endParaRPr>
             </a:p>
           </p:txBody>
         </p:sp>
@@ -16907,18 +16763,13 @@
             <a:p>
               <a:pPr algn="ctr"/>
               <a:r>
-                <a:rPr lang="en-US" sz="1600" i="1" dirty="0" smtClean="0">
+                <a:rPr lang="en-US" sz="1600" i="1" dirty="0">
                   <a:solidFill>
                     <a:srgbClr val="00B050"/>
                   </a:solidFill>
                 </a:rPr>
                 <a:t>No evidence of violations f HOV</a:t>
               </a:r>
-              <a:endParaRPr lang="en-US" sz="1600" i="1" dirty="0">
-                <a:solidFill>
-                  <a:srgbClr val="00B050"/>
-                </a:solidFill>
-              </a:endParaRPr>
             </a:p>
           </p:txBody>
         </p:sp>
@@ -17025,7 +16876,7 @@
             <a:p>
               <a:pPr algn="ctr"/>
               <a:r>
-                <a:rPr lang="en-US" sz="2000" dirty="0" smtClean="0">
+                <a:rPr lang="en-US" sz="2000" dirty="0">
                   <a:solidFill>
                     <a:srgbClr val="FFFF00"/>
                   </a:solidFill>
@@ -17033,12 +16884,6 @@
                 </a:rPr>
                 <a:t>2. Fit the ANOVA</a:t>
               </a:r>
-              <a:endParaRPr lang="en-US" sz="2000" dirty="0">
-                <a:solidFill>
-                  <a:srgbClr val="FFFF00"/>
-                </a:solidFill>
-                <a:latin typeface="PT Serif" panose="020A0603040505020204" pitchFamily="18" charset="77"/>
-              </a:endParaRPr>
             </a:p>
           </p:txBody>
         </p:sp>
@@ -17081,7 +16926,7 @@
             <a:p>
               <a:pPr algn="ctr"/>
               <a:r>
-                <a:rPr lang="en-US" sz="1600" i="1" dirty="0" smtClean="0">
+                <a:rPr lang="en-US" sz="1600" i="1" dirty="0">
                   <a:solidFill>
                     <a:srgbClr val="00B050"/>
                   </a:solidFill>
@@ -17092,18 +16937,13 @@
             <a:p>
               <a:pPr algn="ctr"/>
               <a:r>
-                <a:rPr lang="en-US" sz="1600" i="1" dirty="0" smtClean="0">
+                <a:rPr lang="en-US" sz="1600" i="1" dirty="0">
                   <a:solidFill>
                     <a:srgbClr val="00B050"/>
                   </a:solidFill>
                 </a:rPr>
                 <a:t>Is different</a:t>
               </a:r>
-              <a:endParaRPr lang="en-US" sz="1600" i="1" dirty="0">
-                <a:solidFill>
-                  <a:srgbClr val="00B050"/>
-                </a:solidFill>
-              </a:endParaRPr>
             </a:p>
           </p:txBody>
         </p:sp>
@@ -17210,7 +17050,7 @@
             <a:p>
               <a:pPr algn="ctr"/>
               <a:r>
-                <a:rPr lang="en-US" sz="2000" dirty="0" smtClean="0">
+                <a:rPr lang="en-US" sz="2000" dirty="0">
                   <a:solidFill>
                     <a:srgbClr val="FFFF00"/>
                   </a:solidFill>
@@ -17218,12 +17058,6 @@
                 </a:rPr>
                 <a:t>3. EM means</a:t>
               </a:r>
-              <a:endParaRPr lang="en-US" sz="2000" dirty="0">
-                <a:solidFill>
-                  <a:srgbClr val="FFFF00"/>
-                </a:solidFill>
-                <a:latin typeface="PT Serif" panose="020A0603040505020204" pitchFamily="18" charset="77"/>
-              </a:endParaRPr>
             </a:p>
           </p:txBody>
         </p:sp>
@@ -17290,18 +17124,13 @@
             <a:p>
               <a:pPr algn="ctr"/>
               <a:r>
-                <a:rPr lang="en-US" sz="1600" i="1" dirty="0" smtClean="0">
+                <a:rPr lang="en-US" sz="1600" i="1" dirty="0">
                   <a:solidFill>
                     <a:srgbClr val="00B050"/>
                   </a:solidFill>
                 </a:rPr>
                 <a:t>Close to Raw Means</a:t>
               </a:r>
-              <a:endParaRPr lang="en-US" sz="1600" i="1" dirty="0">
-                <a:solidFill>
-                  <a:srgbClr val="00B050"/>
-                </a:solidFill>
-              </a:endParaRPr>
             </a:p>
           </p:txBody>
         </p:sp>
@@ -17369,26 +17198,11 @@
           <a:lstStyle/>
           <a:p>
             <a:r>
-              <a:rPr lang="en-US" sz="3200" dirty="0" smtClean="0">
-                <a:latin typeface="PT Serif" panose="020A0603040505020204" pitchFamily="18" charset="77"/>
-              </a:rPr>
-              <a:t>Chap 12 - Example</a:t>
-            </a:r>
-            <a:r>
               <a:rPr lang="en-US" sz="3200" dirty="0">
                 <a:latin typeface="PT Serif" panose="020A0603040505020204" pitchFamily="18" charset="77"/>
               </a:rPr>
-              <a:t>: </a:t>
-            </a:r>
-            <a:r>
-              <a:rPr lang="en-US" sz="3200" dirty="0" smtClean="0">
-                <a:latin typeface="PT Serif" panose="020A0603040505020204" pitchFamily="18" charset="77"/>
-              </a:rPr>
-              <a:t>Fit an ANOVA</a:t>
-            </a:r>
-            <a:endParaRPr lang="en-US" sz="3200" dirty="0">
-              <a:latin typeface="PT Serif" panose="020A0603040505020204" pitchFamily="18" charset="77"/>
-            </a:endParaRPr>
+              <a:t>Chap 12 - Example: Fit an ANOVA</a:t>
+            </a:r>
           </a:p>
         </p:txBody>
       </p:sp>
@@ -17988,14 +17802,11 @@
           <a:lstStyle/>
           <a:p>
             <a:r>
-              <a:rPr lang="en-US" sz="3200" dirty="0" smtClean="0">
+              <a:rPr lang="en-US" sz="3200" dirty="0">
                 <a:latin typeface="PT Serif" panose="020A0603040505020204" pitchFamily="18" charset="77"/>
               </a:rPr>
               <a:t>Chap 12 - Example: Post Hoc Tests</a:t>
             </a:r>
-            <a:endParaRPr lang="en-US" sz="3200" dirty="0">
-              <a:latin typeface="PT Serif" panose="020A0603040505020204" pitchFamily="18" charset="77"/>
-            </a:endParaRPr>
           </a:p>
         </p:txBody>
       </p:sp>
@@ -18133,7 +17944,7 @@
             <a:p>
               <a:pPr algn="ctr"/>
               <a:r>
-                <a:rPr lang="en-US" sz="2000" dirty="0" smtClean="0">
+                <a:rPr lang="en-US" sz="2000" dirty="0">
                   <a:solidFill>
                     <a:srgbClr val="FFFF00"/>
                   </a:solidFill>
@@ -18141,12 +17952,6 @@
                 </a:rPr>
                 <a:t>Fisher’s LDS</a:t>
               </a:r>
-              <a:endParaRPr lang="en-US" sz="2000" dirty="0">
-                <a:solidFill>
-                  <a:srgbClr val="FFFF00"/>
-                </a:solidFill>
-                <a:latin typeface="PT Serif" panose="020A0603040505020204" pitchFamily="18" charset="77"/>
-              </a:endParaRPr>
             </a:p>
           </p:txBody>
         </p:sp>
@@ -18213,7 +18018,7 @@
             <a:p>
               <a:pPr algn="ctr"/>
               <a:r>
-                <a:rPr lang="en-US" sz="2000" dirty="0" smtClean="0">
+                <a:rPr lang="en-US" sz="2000" dirty="0">
                   <a:solidFill>
                     <a:srgbClr val="FFFF00"/>
                   </a:solidFill>
@@ -18221,12 +18026,6 @@
                 </a:rPr>
                 <a:t>Tukey’s HSD</a:t>
               </a:r>
-              <a:endParaRPr lang="en-US" sz="2000" dirty="0">
-                <a:solidFill>
-                  <a:srgbClr val="FFFF00"/>
-                </a:solidFill>
-                <a:latin typeface="PT Serif" panose="020A0603040505020204" pitchFamily="18" charset="77"/>
-              </a:endParaRPr>
             </a:p>
           </p:txBody>
         </p:sp>
@@ -18293,7 +18092,7 @@
             <a:p>
               <a:pPr algn="ctr"/>
               <a:r>
-                <a:rPr lang="en-US" sz="2000" dirty="0" err="1" smtClean="0">
+                <a:rPr lang="en-US" sz="2000" dirty="0" err="1">
                   <a:solidFill>
                     <a:srgbClr val="FFFF00"/>
                   </a:solidFill>
@@ -18752,27 +18551,8 @@
                 </a:solidFill>
                 <a:latin typeface="PT Serif" panose="020A0603040505020204" pitchFamily="18" charset="77"/>
               </a:rPr>
-              <a:t>I</a:t>
-            </a:r>
-            <a:r>
-              <a:rPr lang="en-US" dirty="0" smtClean="0">
-                <a:solidFill>
-                  <a:schemeClr val="accent2">
-                    <a:lumMod val="75000"/>
-                  </a:schemeClr>
-                </a:solidFill>
-                <a:latin typeface="PT Serif" panose="020A0603040505020204" pitchFamily="18" charset="77"/>
-              </a:rPr>
-              <a:t>dea</a:t>
-            </a:r>
-            <a:endParaRPr lang="en-US" dirty="0">
-              <a:solidFill>
-                <a:schemeClr val="accent2">
-                  <a:lumMod val="75000"/>
-                </a:schemeClr>
-              </a:solidFill>
-              <a:latin typeface="PT Serif" panose="020A0603040505020204" pitchFamily="18" charset="77"/>
-            </a:endParaRPr>
+              <a:t>Idea</a:t>
+            </a:r>
           </a:p>
         </p:txBody>
       </p:sp>
@@ -18875,17 +18655,8 @@
               <a:rPr lang="en-US" altLang="en-US" sz="2400" dirty="0">
                 <a:latin typeface="PT Serif" panose="020A0603040505020204" pitchFamily="18" charset="77"/>
               </a:rPr>
-              <a:t>Weights selected so means of interest are </a:t>
-            </a:r>
-            <a:r>
-              <a:rPr lang="en-US" altLang="en-US" sz="2400" dirty="0" smtClean="0">
-                <a:latin typeface="PT Serif" panose="020A0603040505020204" pitchFamily="18" charset="77"/>
-              </a:rPr>
-              <a:t>compared:</a:t>
-            </a:r>
-            <a:endParaRPr lang="en-US" altLang="en-US" sz="2400" dirty="0">
-              <a:latin typeface="PT Serif" panose="020A0603040505020204" pitchFamily="18" charset="77"/>
-            </a:endParaRPr>
+              <a:t>Weights selected so means of interest are compared:</a:t>
+            </a:r>
           </a:p>
           <a:p>
             <a:pPr lvl="4"/>
@@ -18902,39 +18673,30 @@
                 </a:solidFill>
                 <a:latin typeface="PT Serif" panose="020A0603040505020204" pitchFamily="18" charset="77"/>
               </a:rPr>
-              <a:t>Sum of weights = </a:t>
-            </a:r>
-            <a:r>
-              <a:rPr lang="en-US" altLang="en-US" sz="2400" b="1" dirty="0" smtClean="0">
-                <a:solidFill>
-                  <a:srgbClr val="FF0000"/>
-                </a:solidFill>
-                <a:latin typeface="PT Serif" panose="020A0603040505020204" pitchFamily="18" charset="77"/>
-              </a:rPr>
-              <a:t>ZERO</a:t>
-            </a:r>
-          </a:p>
-          <a:p>
-            <a:r>
-              <a:rPr lang="en-US" altLang="en-US" sz="2400" dirty="0" smtClean="0">
+              <a:t>Sum of weights = ZERO</a:t>
+            </a:r>
+          </a:p>
+          <a:p>
+            <a:r>
+              <a:rPr lang="en-US" altLang="en-US" sz="2400" dirty="0">
                 <a:latin typeface="PT Serif" panose="020A0603040505020204" pitchFamily="18" charset="77"/>
               </a:rPr>
               <a:t>One side </a:t>
             </a:r>
             <a:r>
-              <a:rPr lang="en-US" altLang="en-US" sz="2400" b="1" dirty="0" smtClean="0">
+              <a:rPr lang="en-US" altLang="en-US" sz="2400" b="1" dirty="0">
                 <a:latin typeface="PT Serif" panose="020A0603040505020204" pitchFamily="18" charset="77"/>
               </a:rPr>
               <a:t>positive</a:t>
             </a:r>
             <a:r>
-              <a:rPr lang="en-US" altLang="en-US" sz="2400" dirty="0" smtClean="0">
+              <a:rPr lang="en-US" altLang="en-US" sz="2400" dirty="0">
                 <a:latin typeface="PT Serif" panose="020A0603040505020204" pitchFamily="18" charset="77"/>
               </a:rPr>
               <a:t>, the other </a:t>
             </a:r>
             <a:r>
-              <a:rPr lang="en-US" altLang="en-US" sz="2400" b="1" dirty="0" smtClean="0">
+              <a:rPr lang="en-US" altLang="en-US" sz="2400" b="1" dirty="0">
                 <a:latin typeface="PT Serif" panose="020A0603040505020204" pitchFamily="18" charset="77"/>
               </a:rPr>
               <a:t>negative</a:t>
@@ -18942,20 +18704,20 @@
           </a:p>
           <a:p>
             <a:r>
-              <a:rPr lang="en-US" altLang="en-US" sz="2400" dirty="0" smtClean="0">
+              <a:rPr lang="en-US" altLang="en-US" sz="2400" dirty="0">
                 <a:latin typeface="PT Serif" panose="020A0603040505020204" pitchFamily="18" charset="77"/>
               </a:rPr>
               <a:t>Weights on the same size are </a:t>
             </a:r>
             <a:r>
-              <a:rPr lang="en-US" altLang="en-US" sz="2400" b="1" dirty="0" smtClean="0">
+              <a:rPr lang="en-US" altLang="en-US" sz="2400" b="1" dirty="0">
                 <a:latin typeface="PT Serif" panose="020A0603040505020204" pitchFamily="18" charset="77"/>
               </a:rPr>
               <a:t>EQUAL</a:t>
             </a:r>
           </a:p>
           <a:p>
-            <a:endParaRPr lang="en-US" altLang="en-US" sz="2400" dirty="0" smtClean="0">
+            <a:endParaRPr lang="en-US" altLang="en-US" sz="2400" dirty="0">
               <a:latin typeface="PT Serif" panose="020A0603040505020204" pitchFamily="18" charset="77"/>
             </a:endParaRPr>
           </a:p>
@@ -19040,7 +18802,7 @@
               </a:bodyPr>
               <a:lstStyle/>
               <a:p>
-                <a:endParaRPr lang="en-US" altLang="en-US" dirty="0" smtClean="0">
+                <a:endParaRPr lang="en-US" altLang="en-US" dirty="0">
                   <a:solidFill>
                     <a:schemeClr val="accent2"/>
                   </a:solidFill>
@@ -19814,7 +19576,7 @@
                     </m:oMath>
                   </m:oMathPara>
                 </a14:m>
-                <a:endParaRPr lang="en-US" altLang="en-US" b="1" dirty="0" smtClean="0">
+                <a:endParaRPr lang="en-US" altLang="en-US" b="1" dirty="0">
                   <a:solidFill>
                     <a:schemeClr val="accent6">
                       <a:lumMod val="75000"/>
@@ -19825,7 +19587,7 @@
               </a:p>
               <a:p>
                 <a:pPr algn="ctr"/>
-                <a:endParaRPr lang="en-US" altLang="en-US" b="1" dirty="0" smtClean="0">
+                <a:endParaRPr lang="en-US" altLang="en-US" b="1" dirty="0">
                   <a:solidFill>
                     <a:schemeClr val="accent6">
                       <a:lumMod val="75000"/>
@@ -19978,27 +19740,6 @@
                     </m:sSub>
                   </m:oMath>
                 </a14:m>
-                <a:endParaRPr lang="en-US" altLang="en-US" b="1" dirty="0" smtClean="0">
-                  <a:solidFill>
-                    <a:schemeClr val="accent6">
-                      <a:lumMod val="75000"/>
-                    </a:schemeClr>
-                  </a:solidFill>
-                  <a:latin typeface="PT Serif" panose="020A0603040505020204" pitchFamily="18" charset="77"/>
-                </a:endParaRPr>
-              </a:p>
-              <a:p>
-                <a:r>
-                  <a:rPr lang="en-US" altLang="en-US" b="1" dirty="0" smtClean="0">
-                    <a:solidFill>
-                      <a:schemeClr val="accent6">
-                        <a:lumMod val="75000"/>
-                      </a:schemeClr>
-                    </a:solidFill>
-                    <a:latin typeface="PT Serif" panose="020A0603040505020204" pitchFamily="18" charset="77"/>
-                  </a:rPr>
-                  <a:t>     </a:t>
-                </a:r>
                 <a:endParaRPr lang="en-US" altLang="en-US" b="1" dirty="0">
                   <a:solidFill>
                     <a:schemeClr val="accent6">
@@ -20010,14 +19751,18 @@
               </a:p>
               <a:p>
                 <a:r>
-                  <a:rPr lang="en-US" altLang="en-US" dirty="0" smtClean="0">
+                  <a:rPr lang="en-US" altLang="en-US" b="1" dirty="0">
                     <a:solidFill>
-                      <a:schemeClr val="accent2"/>
+                      <a:schemeClr val="accent6">
+                        <a:lumMod val="75000"/>
+                      </a:schemeClr>
                     </a:solidFill>
                     <a:latin typeface="PT Serif" panose="020A0603040505020204" pitchFamily="18" charset="77"/>
                   </a:rPr>
-                  <a:t>Example </a:t>
+                  <a:t>     </a:t>
                 </a:r>
+              </a:p>
+              <a:p>
                 <a:r>
                   <a:rPr lang="en-US" altLang="en-US" dirty="0">
                     <a:solidFill>
@@ -20025,7 +19770,7 @@
                     </a:solidFill>
                     <a:latin typeface="PT Serif" panose="020A0603040505020204" pitchFamily="18" charset="77"/>
                   </a:rPr>
-                  <a:t>2: Same 4 means</a:t>
+                  <a:t>Example 2: Same 4 means</a:t>
                 </a:r>
               </a:p>
               <a:p>
@@ -20388,22 +20133,12 @@
                     <a:latin typeface="PT Serif" panose="020A0603040505020204" pitchFamily="18" charset="77"/>
                     <a:ea typeface="ＭＳ Ｐゴシック" panose="020B0600070205080204" pitchFamily="34" charset="-128"/>
                   </a:rPr>
-                  <a:t>-</a:t>
-                </a:r>
-                <a:r>
-                  <a:rPr lang="en-US" altLang="en-US" b="1" noProof="1" smtClean="0">
-                    <a:solidFill>
-                      <a:srgbClr val="FF0000"/>
-                    </a:solidFill>
-                    <a:latin typeface="PT Serif" panose="020A0603040505020204" pitchFamily="18" charset="77"/>
-                    <a:ea typeface="ＭＳ Ｐゴシック" panose="020B0600070205080204" pitchFamily="34" charset="-128"/>
-                  </a:rPr>
-                  <a:t>1</a:t>
+                  <a:t>-1</a:t>
                 </a:r>
               </a:p>
               <a:p>
                 <a:pPr lvl="1"/>
-                <a:endParaRPr lang="en-US" altLang="en-US" noProof="1" smtClean="0">
+                <a:endParaRPr lang="en-US" altLang="en-US" noProof="1">
                   <a:solidFill>
                     <a:schemeClr val="accent2"/>
                   </a:solidFill>
@@ -21196,7 +20931,7 @@
                   </m:oMath>
                 </a14:m>
                 <a:r>
-                  <a:rPr lang="en-US" altLang="en-US" dirty="0" smtClean="0">
+                  <a:rPr lang="en-US" altLang="en-US" dirty="0">
                     <a:solidFill>
                       <a:schemeClr val="accent2"/>
                     </a:solidFill>
@@ -21322,9 +21057,7 @@
           <p:cNvGraphicFramePr>
             <a:graphicFrameLocks noChangeAspect="1"/>
           </p:cNvGraphicFramePr>
-          <p:nvPr>
-            <p:extLst/>
-          </p:nvPr>
+          <p:nvPr/>
         </p:nvGraphicFramePr>
         <p:xfrm>
           <a:off x="401169" y="2206068"/>
@@ -21334,7 +21067,7 @@
           <a:graphicData uri="http://schemas.openxmlformats.org/presentationml/2006/ole">
             <mc:AlternateContent xmlns:mc="http://schemas.openxmlformats.org/markup-compatibility/2006">
               <mc:Choice xmlns:v="urn:schemas-microsoft-com:vml" Requires="v">
-                <p:oleObj spid="_x0000_s9223" name="Equation" r:id="rId4" imgW="2336760" imgH="431640" progId="Equation.DSMT4">
+                <p:oleObj name="Equation" r:id="rId4" imgW="2336760" imgH="431640" progId="Equation.DSMT4">
                   <p:embed/>
                 </p:oleObj>
               </mc:Choice>
@@ -21376,7 +21109,6 @@
                           <a:lumOff val="80000"/>
                         </a:schemeClr>
                       </a:solidFill>
-                      <a:extLst/>
                     </p:spPr>
                   </p:pic>
                 </p:oleObj>
@@ -22463,19 +22195,19 @@
           <a:lstStyle/>
           <a:p>
             <a:r>
-              <a:rPr lang="fr-FR" dirty="0" smtClean="0"/>
+              <a:rPr lang="fr-FR" dirty="0"/>
               <a:t>Cohen </a:t>
             </a:r>
             <a:r>
-              <a:rPr lang="fr-FR" dirty="0" err="1" smtClean="0"/>
+              <a:rPr lang="fr-FR" dirty="0" err="1"/>
               <a:t>Chap</a:t>
             </a:r>
             <a:r>
-              <a:rPr lang="fr-FR" dirty="0" smtClean="0"/>
+              <a:rPr lang="fr-FR" dirty="0"/>
               <a:t> 13 - Multiple </a:t>
             </a:r>
             <a:r>
-              <a:rPr lang="fr-FR" dirty="0" err="1" smtClean="0"/>
+              <a:rPr lang="fr-FR" dirty="0" err="1"/>
               <a:t>Comparisons</a:t>
             </a:r>
             <a:endParaRPr lang="en-US" dirty="0"/>
@@ -22548,7 +22280,7 @@
               <a:t> - </a:t>
             </a:r>
             <a:r>
-              <a:rPr lang="en-US" dirty="0" smtClean="0">
+              <a:rPr lang="en-US" dirty="0">
                 <a:solidFill>
                   <a:schemeClr val="accent2">
                     <a:lumMod val="75000"/>
@@ -22558,14 +22290,6 @@
               </a:rPr>
               <a:t>Formulas</a:t>
             </a:r>
-            <a:endParaRPr lang="en-US" dirty="0">
-              <a:solidFill>
-                <a:schemeClr val="accent2">
-                  <a:lumMod val="75000"/>
-                </a:schemeClr>
-              </a:solidFill>
-              <a:latin typeface="PT Serif" panose="020A0603040505020204" pitchFamily="18" charset="77"/>
-            </a:endParaRPr>
           </a:p>
         </p:txBody>
       </p:sp>
@@ -22593,7 +22317,7 @@
           <a:p>
             <a:pPr algn="ctr"/>
             <a:r>
-              <a:rPr lang="en-US" b="1" dirty="0" smtClean="0">
+              <a:rPr lang="en-US" b="1" dirty="0">
                 <a:solidFill>
                   <a:srgbClr val="FF0000"/>
                 </a:solidFill>
@@ -22601,7 +22325,7 @@
               <a:t>MS</a:t>
             </a:r>
             <a:r>
-              <a:rPr lang="en-US" b="1" baseline="-25000" dirty="0" smtClean="0">
+              <a:rPr lang="en-US" b="1" baseline="-25000" dirty="0">
                 <a:solidFill>
                   <a:srgbClr val="FF0000"/>
                 </a:solidFill>
@@ -22609,34 +22333,13 @@
               <a:t>W</a:t>
             </a:r>
             <a:r>
-              <a:rPr lang="en-US" b="1" dirty="0" smtClean="0">
+              <a:rPr lang="en-US" b="1" dirty="0">
                 <a:solidFill>
                   <a:srgbClr val="FF0000"/>
                 </a:solidFill>
               </a:rPr>
-              <a:t> </a:t>
-            </a:r>
-            <a:r>
-              <a:rPr lang="en-US" b="1" dirty="0">
-                <a:solidFill>
-                  <a:srgbClr val="FF0000"/>
-                </a:solidFill>
-              </a:rPr>
-              <a:t> </a:t>
-            </a:r>
-            <a:r>
-              <a:rPr lang="en-US" b="1" dirty="0" smtClean="0">
-                <a:solidFill>
-                  <a:srgbClr val="FF0000"/>
-                </a:solidFill>
-              </a:rPr>
-              <a:t>= MSE = pooled variance</a:t>
-            </a:r>
-            <a:endParaRPr lang="en-US" b="1" dirty="0">
-              <a:solidFill>
-                <a:srgbClr val="FF0000"/>
-              </a:solidFill>
-            </a:endParaRPr>
+              <a:t>  = MSE = pooled variance</a:t>
+            </a:r>
           </a:p>
         </p:txBody>
       </p:sp>
@@ -24094,9 +23797,7 @@
           <p:cNvGraphicFramePr>
             <a:graphicFrameLocks noChangeAspect="1"/>
           </p:cNvGraphicFramePr>
-          <p:nvPr>
-            <p:extLst/>
-          </p:nvPr>
+          <p:nvPr/>
         </p:nvGraphicFramePr>
         <p:xfrm>
           <a:off x="579003" y="2658129"/>
@@ -24106,12 +23807,12 @@
           <a:graphicData uri="http://schemas.openxmlformats.org/presentationml/2006/ole">
             <mc:AlternateContent xmlns:mc="http://schemas.openxmlformats.org/markup-compatibility/2006">
               <mc:Choice xmlns:v="urn:schemas-microsoft-com:vml" Requires="v">
-                <p:oleObj spid="_x0000_s10257" name="Equation" r:id="rId3" imgW="2006280" imgH="888840" progId="Equation.DSMT4">
+                <p:oleObj name="Equation" r:id="rId2" imgW="2006280" imgH="888840" progId="Equation.DSMT4">
                   <p:embed/>
                 </p:oleObj>
               </mc:Choice>
               <mc:Fallback>
-                <p:oleObj name="Equation" r:id="rId3" imgW="2006280" imgH="888840" progId="Equation.DSMT4">
+                <p:oleObj name="Equation" r:id="rId2" imgW="2006280" imgH="888840" progId="Equation.DSMT4">
                   <p:embed/>
                   <p:pic>
                     <p:nvPicPr>
@@ -24122,7 +23823,7 @@
                       <p:nvPr/>
                     </p:nvPicPr>
                     <p:blipFill>
-                      <a:blip r:embed="rId4">
+                      <a:blip r:embed="rId3">
                         <a:extLst>
                           <a:ext uri="{28A0092B-C50C-407E-A947-70E740481C1C}">
                             <a14:useLocalDpi xmlns:a14="http://schemas.microsoft.com/office/drawing/2010/main" val="0"/>
@@ -24161,9 +23862,7 @@
           <p:cNvGraphicFramePr>
             <a:graphicFrameLocks noChangeAspect="1"/>
           </p:cNvGraphicFramePr>
-          <p:nvPr>
-            <p:extLst/>
-          </p:nvPr>
+          <p:nvPr/>
         </p:nvGraphicFramePr>
         <p:xfrm>
           <a:off x="4159671" y="2602285"/>
@@ -24173,12 +23872,12 @@
           <a:graphicData uri="http://schemas.openxmlformats.org/presentationml/2006/ole">
             <mc:AlternateContent xmlns:mc="http://schemas.openxmlformats.org/markup-compatibility/2006">
               <mc:Choice xmlns:v="urn:schemas-microsoft-com:vml" Requires="v">
-                <p:oleObj spid="_x0000_s10258" name="Equation" r:id="rId5" imgW="2044440" imgH="952200" progId="Equation.DSMT4">
+                <p:oleObj name="Equation" r:id="rId4" imgW="2044440" imgH="952200" progId="Equation.DSMT4">
                   <p:embed/>
                 </p:oleObj>
               </mc:Choice>
               <mc:Fallback>
-                <p:oleObj name="Equation" r:id="rId5" imgW="2044440" imgH="952200" progId="Equation.DSMT4">
+                <p:oleObj name="Equation" r:id="rId4" imgW="2044440" imgH="952200" progId="Equation.DSMT4">
                   <p:embed/>
                   <p:pic>
                     <p:nvPicPr>
@@ -24189,7 +23888,7 @@
                       <p:nvPr/>
                     </p:nvPicPr>
                     <p:blipFill>
-                      <a:blip r:embed="rId6">
+                      <a:blip r:embed="rId5">
                         <a:extLst>
                           <a:ext uri="{28A0092B-C50C-407E-A947-70E740481C1C}">
                             <a14:useLocalDpi xmlns:a14="http://schemas.microsoft.com/office/drawing/2010/main" val="0"/>
@@ -25036,9 +24735,7 @@
           <p:cNvGraphicFramePr>
             <a:graphicFrameLocks noChangeAspect="1"/>
           </p:cNvGraphicFramePr>
-          <p:nvPr>
-            <p:extLst/>
-          </p:nvPr>
+          <p:nvPr/>
         </p:nvGraphicFramePr>
         <p:xfrm>
           <a:off x="1407439" y="5676446"/>
@@ -25048,12 +24745,12 @@
           <a:graphicData uri="http://schemas.openxmlformats.org/presentationml/2006/ole">
             <mc:AlternateContent xmlns:mc="http://schemas.openxmlformats.org/markup-compatibility/2006">
               <mc:Choice xmlns:v="urn:schemas-microsoft-com:vml" Requires="v">
-                <p:oleObj spid="_x0000_s10259" name="Equation" r:id="rId7" imgW="3759120" imgH="749160" progId="Equation.DSMT4">
+                <p:oleObj name="Equation" r:id="rId6" imgW="3759120" imgH="749160" progId="Equation.DSMT4">
                   <p:embed/>
                 </p:oleObj>
               </mc:Choice>
               <mc:Fallback>
-                <p:oleObj name="Equation" r:id="rId7" imgW="3759120" imgH="749160" progId="Equation.DSMT4">
+                <p:oleObj name="Equation" r:id="rId6" imgW="3759120" imgH="749160" progId="Equation.DSMT4">
                   <p:embed/>
                   <p:pic>
                     <p:nvPicPr>
@@ -25064,7 +24761,7 @@
                       <p:nvPr/>
                     </p:nvPicPr>
                     <p:blipFill>
-                      <a:blip r:embed="rId8">
+                      <a:blip r:embed="rId7">
                         <a:extLst>
                           <a:ext uri="{28A0092B-C50C-407E-A947-70E740481C1C}">
                             <a14:useLocalDpi xmlns:a14="http://schemas.microsoft.com/office/drawing/2010/main" val="0"/>
@@ -26643,9 +26340,7 @@
           <p:cNvGraphicFramePr>
             <a:graphicFrameLocks noGrp="1"/>
           </p:cNvGraphicFramePr>
-          <p:nvPr>
-            <p:extLst/>
-          </p:nvPr>
+          <p:nvPr/>
         </p:nvGraphicFramePr>
         <p:xfrm>
           <a:off x="9354178" y="1259070"/>
@@ -27335,17 +27030,10 @@
                 <a:latin typeface="PT Serif" panose="020A0603040505020204" pitchFamily="18" charset="77"/>
                 <a:ea typeface="ＭＳ Ｐゴシック" panose="020B0600070205080204" pitchFamily="34" charset="-128"/>
               </a:rPr>
-              <a:t> – 1 = 1 </a:t>
-            </a:r>
-            <a:r>
-              <a:rPr lang="en-US" altLang="en-US" dirty="0" smtClean="0">
-                <a:latin typeface="PT Serif" panose="020A0603040505020204" pitchFamily="18" charset="77"/>
-                <a:ea typeface="ＭＳ Ｐゴシック" panose="020B0600070205080204" pitchFamily="34" charset="-128"/>
-              </a:rPr>
-              <a:t>       </a:t>
-            </a:r>
-            <a:r>
-              <a:rPr lang="en-US" altLang="en-US" dirty="0" smtClean="0">
+              <a:t> – 1 = 1        </a:t>
+            </a:r>
+            <a:r>
+              <a:rPr lang="en-US" altLang="en-US" dirty="0">
                 <a:latin typeface="PT Serif" panose="020A0603040505020204" pitchFamily="18" charset="77"/>
                 <a:ea typeface="ＭＳ Ｐゴシック" panose="020B0600070205080204" pitchFamily="34" charset="-128"/>
                 <a:sym typeface="Wingdings" panose="05000000000000000000" pitchFamily="2" charset="2"/>
@@ -27383,7 +27071,7 @@
               <a:t>= </a:t>
             </a:r>
             <a:r>
-              <a:rPr lang="en-US" altLang="en-US" dirty="0" smtClean="0">
+              <a:rPr lang="en-US" altLang="en-US" dirty="0">
                 <a:solidFill>
                   <a:schemeClr val="tx1"/>
                 </a:solidFill>
@@ -27394,27 +27082,19 @@
               <a:t>26.13</a:t>
             </a:r>
             <a:r>
-              <a:rPr lang="en-US" altLang="en-US" dirty="0" smtClean="0">
+              <a:rPr lang="en-US" altLang="en-US" dirty="0">
                 <a:latin typeface="PT Serif" panose="020A0603040505020204" pitchFamily="18" charset="77"/>
                 <a:ea typeface="ＭＳ Ｐゴシック" panose="020B0600070205080204" pitchFamily="34" charset="-128"/>
                 <a:sym typeface="Wingdings" panose="05000000000000000000" pitchFamily="2" charset="2"/>
               </a:rPr>
-              <a:t>/1 </a:t>
-            </a:r>
-            <a:r>
-              <a:rPr lang="en-US" altLang="en-US" dirty="0">
+              <a:t>/1 = </a:t>
+            </a:r>
+            <a:r>
+              <a:rPr lang="en-US" altLang="en-US" b="1" dirty="0">
                 <a:latin typeface="PT Serif" panose="020A0603040505020204" pitchFamily="18" charset="77"/>
                 <a:ea typeface="ＭＳ Ｐゴシック" panose="020B0600070205080204" pitchFamily="34" charset="-128"/>
                 <a:sym typeface="Wingdings" panose="05000000000000000000" pitchFamily="2" charset="2"/>
               </a:rPr>
-              <a:t>= </a:t>
-            </a:r>
-            <a:r>
-              <a:rPr lang="en-US" altLang="en-US" b="1" dirty="0">
-                <a:latin typeface="PT Serif" panose="020A0603040505020204" pitchFamily="18" charset="77"/>
-                <a:ea typeface="ＭＳ Ｐゴシック" panose="020B0600070205080204" pitchFamily="34" charset="-128"/>
-                <a:sym typeface="Wingdings" panose="05000000000000000000" pitchFamily="2" charset="2"/>
-              </a:rPr>
               <a:t>26.13</a:t>
             </a:r>
           </a:p>
@@ -27456,17 +27136,10 @@
                 <a:latin typeface="PT Serif" panose="020A0603040505020204" pitchFamily="18" charset="77"/>
                 <a:cs typeface="Times New Roman" panose="02020603050405020304" pitchFamily="18" charset="0"/>
               </a:rPr>
-              <a:t> – 3 = 12 </a:t>
-            </a:r>
-            <a:r>
-              <a:rPr lang="en-US" dirty="0" smtClean="0">
-                <a:latin typeface="PT Serif" panose="020A0603040505020204" pitchFamily="18" charset="77"/>
-                <a:cs typeface="Times New Roman" panose="02020603050405020304" pitchFamily="18" charset="0"/>
-              </a:rPr>
-              <a:t>  </a:t>
-            </a:r>
-            <a:r>
-              <a:rPr lang="en-US" dirty="0" smtClean="0">
+              <a:t> – 3 = 12   </a:t>
+            </a:r>
+            <a:r>
+              <a:rPr lang="en-US" dirty="0">
                 <a:latin typeface="PT Serif" panose="020A0603040505020204" pitchFamily="18" charset="77"/>
                 <a:cs typeface="Times New Roman" panose="02020603050405020304" pitchFamily="18" charset="0"/>
                 <a:sym typeface="Wingdings" panose="05000000000000000000" pitchFamily="2" charset="2"/>
@@ -30372,14 +30045,6 @@
   <p:clrMapOvr>
     <a:masterClrMapping/>
   </p:clrMapOvr>
-  <mc:AlternateContent xmlns:mc="http://schemas.openxmlformats.org/markup-compatibility/2006">
-    <mc:Choice xmlns:p14="http://schemas.microsoft.com/office/powerpoint/2010/main" Requires="p14">
-      <p:transition spd="slow" p14:dur="2000"/>
-    </mc:Choice>
-    <mc:Fallback>
-      <p:transition spd="slow"/>
-    </mc:Fallback>
-  </mc:AlternateContent>
   <p:timing>
     <p:tnLst>
       <p:par>
@@ -30939,9 +30604,7 @@
           <p:cNvGraphicFramePr>
             <a:graphicFrameLocks noChangeAspect="1"/>
           </p:cNvGraphicFramePr>
-          <p:nvPr>
-            <p:extLst/>
-          </p:nvPr>
+          <p:nvPr/>
         </p:nvGraphicFramePr>
         <p:xfrm>
           <a:off x="2678935" y="3188638"/>
@@ -30951,12 +30614,12 @@
           <a:graphicData uri="http://schemas.openxmlformats.org/presentationml/2006/ole">
             <mc:AlternateContent xmlns:mc="http://schemas.openxmlformats.org/markup-compatibility/2006">
               <mc:Choice xmlns:v="urn:schemas-microsoft-com:vml" Requires="v">
-                <p:oleObj spid="_x0000_s11276" name="Equation" r:id="rId3" imgW="583920" imgH="444240" progId="Equation.DSMT4">
+                <p:oleObj name="Equation" r:id="rId2" imgW="583920" imgH="444240" progId="Equation.DSMT4">
                   <p:embed/>
                 </p:oleObj>
               </mc:Choice>
               <mc:Fallback>
-                <p:oleObj name="Equation" r:id="rId3" imgW="583920" imgH="444240" progId="Equation.DSMT4">
+                <p:oleObj name="Equation" r:id="rId2" imgW="583920" imgH="444240" progId="Equation.DSMT4">
                   <p:embed/>
                   <p:pic>
                     <p:nvPicPr>
@@ -30967,7 +30630,7 @@
                       <p:nvPr/>
                     </p:nvPicPr>
                     <p:blipFill>
-                      <a:blip r:embed="rId4">
+                      <a:blip r:embed="rId3">
                         <a:extLst>
                           <a:ext uri="{28A0092B-C50C-407E-A947-70E740481C1C}">
                             <a14:useLocalDpi xmlns:a14="http://schemas.microsoft.com/office/drawing/2010/main" val="0"/>
@@ -30988,7 +30651,6 @@
                         <a:avLst/>
                       </a:prstGeom>
                       <a:noFill/>
-                      <a:extLst/>
                     </p:spPr>
                   </p:pic>
                 </p:oleObj>
@@ -31003,9 +30665,7 @@
           <p:cNvGraphicFramePr>
             <a:graphicFrameLocks noChangeAspect="1"/>
           </p:cNvGraphicFramePr>
-          <p:nvPr>
-            <p:extLst/>
-          </p:nvPr>
+          <p:nvPr/>
         </p:nvGraphicFramePr>
         <p:xfrm>
           <a:off x="6636599" y="3188638"/>
@@ -31015,12 +30675,12 @@
           <a:graphicData uri="http://schemas.openxmlformats.org/presentationml/2006/ole">
             <mc:AlternateContent xmlns:mc="http://schemas.openxmlformats.org/markup-compatibility/2006">
               <mc:Choice xmlns:v="urn:schemas-microsoft-com:vml" Requires="v">
-                <p:oleObj spid="_x0000_s11277" name="Equation" r:id="rId5" imgW="939600" imgH="444240" progId="Equation.DSMT4">
+                <p:oleObj name="Equation" r:id="rId4" imgW="939600" imgH="444240" progId="Equation.DSMT4">
                   <p:embed/>
                 </p:oleObj>
               </mc:Choice>
               <mc:Fallback>
-                <p:oleObj name="Equation" r:id="rId5" imgW="939600" imgH="444240" progId="Equation.DSMT4">
+                <p:oleObj name="Equation" r:id="rId4" imgW="939600" imgH="444240" progId="Equation.DSMT4">
                   <p:embed/>
                   <p:pic>
                     <p:nvPicPr>
@@ -31031,7 +30691,7 @@
                       <p:nvPr/>
                     </p:nvPicPr>
                     <p:blipFill>
-                      <a:blip r:embed="rId6">
+                      <a:blip r:embed="rId5">
                         <a:extLst>
                           <a:ext uri="{28A0092B-C50C-407E-A947-70E740481C1C}">
                             <a14:useLocalDpi xmlns:a14="http://schemas.microsoft.com/office/drawing/2010/main" val="0"/>
@@ -31052,7 +30712,6 @@
                         <a:avLst/>
                       </a:prstGeom>
                       <a:noFill/>
-                      <a:extLst/>
                     </p:spPr>
                   </p:pic>
                 </p:oleObj>
@@ -31071,21 +30730,6 @@
   <p:clrMapOvr>
     <a:masterClrMapping/>
   </p:clrMapOvr>
-  <mc:AlternateContent xmlns:mc="http://schemas.openxmlformats.org/markup-compatibility/2006">
-    <mc:Choice xmlns:p14="http://schemas.microsoft.com/office/powerpoint/2010/main" Requires="p14">
-      <p:transition spd="slow" p14:dur="2000"/>
-    </mc:Choice>
-    <mc:Fallback>
-      <p:transition spd="slow"/>
-    </mc:Fallback>
-  </mc:AlternateContent>
-  <p:timing>
-    <p:tnLst>
-      <p:par>
-        <p:cTn id="1" dur="indefinite" restart="never" nodeType="tmRoot"/>
-      </p:par>
-    </p:tnLst>
-  </p:timing>
 </p:sld>
 </file>
 
@@ -31153,14 +30797,11 @@
           <a:lstStyle/>
           <a:p>
             <a:r>
-              <a:rPr lang="en-US" sz="3200" dirty="0" smtClean="0">
+              <a:rPr lang="en-US" sz="3200" dirty="0">
                 <a:latin typeface="PT Serif" panose="020A0603040505020204" pitchFamily="18" charset="77"/>
               </a:rPr>
               <a:t>Chap 12 - Example: Linear Contrasts</a:t>
             </a:r>
-            <a:endParaRPr lang="en-US" sz="3200" dirty="0">
-              <a:latin typeface="PT Serif" panose="020A0603040505020204" pitchFamily="18" charset="77"/>
-            </a:endParaRPr>
           </a:p>
         </p:txBody>
       </p:sp>
@@ -31298,7 +30939,7 @@
             <a:p>
               <a:pPr algn="ctr"/>
               <a:r>
-                <a:rPr lang="en-US" sz="2000" dirty="0" smtClean="0">
+                <a:rPr lang="en-US" sz="2000" dirty="0">
                   <a:solidFill>
                     <a:srgbClr val="FFFF00"/>
                   </a:solidFill>
@@ -31306,12 +30947,6 @@
                 </a:rPr>
                 <a:t>No Adjustment</a:t>
               </a:r>
-              <a:endParaRPr lang="en-US" sz="2000" dirty="0">
-                <a:solidFill>
-                  <a:srgbClr val="FFFF00"/>
-                </a:solidFill>
-                <a:latin typeface="PT Serif" panose="020A0603040505020204" pitchFamily="18" charset="77"/>
-              </a:endParaRPr>
             </a:p>
           </p:txBody>
         </p:sp>
@@ -31378,7 +31013,7 @@
             <a:p>
               <a:pPr algn="ctr"/>
               <a:r>
-                <a:rPr lang="en-US" sz="2000" dirty="0" err="1" smtClean="0">
+                <a:rPr lang="en-US" sz="2000" dirty="0" err="1">
                   <a:solidFill>
                     <a:srgbClr val="FFFF00"/>
                   </a:solidFill>
@@ -31458,7 +31093,7 @@
             <a:p>
               <a:pPr algn="ctr"/>
               <a:r>
-                <a:rPr lang="en-US" sz="2000" dirty="0" err="1" smtClean="0">
+                <a:rPr lang="en-US" sz="2000" dirty="0" err="1">
                   <a:solidFill>
                     <a:srgbClr val="FFFF00"/>
                   </a:solidFill>
@@ -31467,7 +31102,7 @@
                 <a:t>Scheffe</a:t>
               </a:r>
               <a:r>
-                <a:rPr lang="en-US" sz="2000" dirty="0" smtClean="0">
+                <a:rPr lang="en-US" sz="2000" dirty="0">
                   <a:solidFill>
                     <a:srgbClr val="FFFF00"/>
                   </a:solidFill>
@@ -31475,12 +31110,6 @@
                 </a:rPr>
                 <a:t>’</a:t>
               </a:r>
-              <a:endParaRPr lang="en-US" sz="2000" dirty="0">
-                <a:solidFill>
-                  <a:srgbClr val="FFFF00"/>
-                </a:solidFill>
-                <a:latin typeface="PT Serif" panose="020A0603040505020204" pitchFamily="18" charset="77"/>
-              </a:endParaRPr>
             </a:p>
           </p:txBody>
         </p:sp>
@@ -32062,13 +31691,6 @@
   <p:clrMapOvr>
     <a:masterClrMapping/>
   </p:clrMapOvr>
-  <p:timing>
-    <p:tnLst>
-      <p:par>
-        <p:cTn id="1" dur="indefinite" restart="never" nodeType="tmRoot"/>
-      </p:par>
-    </p:tnLst>
-  </p:timing>
 </p:sld>
 </file>
 
@@ -32490,13 +32112,6 @@
   <p:clrMapOvr>
     <a:masterClrMapping/>
   </p:clrMapOvr>
-  <p:timing>
-    <p:tnLst>
-      <p:par>
-        <p:cTn id="1" dur="indefinite" restart="never" nodeType="tmRoot"/>
-      </p:par>
-    </p:tnLst>
-  </p:timing>
 </p:sld>
 </file>
 
@@ -32887,13 +32502,6 @@
   <p:clrMapOvr>
     <a:masterClrMapping/>
   </p:clrMapOvr>
-  <p:timing>
-    <p:tnLst>
-      <p:par>
-        <p:cTn id="1" dur="indefinite" restart="never" nodeType="tmRoot"/>
-      </p:par>
-    </p:tnLst>
-  </p:timing>
 </p:sld>
 </file>
 
@@ -33312,13 +32920,6 @@
   <p:clrMapOvr>
     <a:masterClrMapping/>
   </p:clrMapOvr>
-  <p:timing>
-    <p:tnLst>
-      <p:par>
-        <p:cTn id="1" dur="indefinite" restart="never" nodeType="tmRoot"/>
-      </p:par>
-    </p:tnLst>
-  </p:timing>
 </p:sld>
 </file>
 
@@ -33410,13 +33011,6 @@
   <p:clrMapOvr>
     <a:masterClrMapping/>
   </p:clrMapOvr>
-  <p:timing>
-    <p:tnLst>
-      <p:par>
-        <p:cTn id="1" dur="indefinite" restart="never" nodeType="tmRoot"/>
-      </p:par>
-    </p:tnLst>
-  </p:timing>
 </p:sld>
 </file>
 
@@ -34661,8 +34255,8 @@
         </p:nvSpPr>
         <p:spPr>
           <a:xfrm>
-            <a:off x="779134" y="3313992"/>
-            <a:ext cx="5174748" cy="2369880"/>
+            <a:off x="329783" y="3313992"/>
+            <a:ext cx="5624099" cy="1877437"/>
           </a:xfrm>
           <a:prstGeom prst="rect">
             <a:avLst/>

</xml_diff>